<commit_message>
added additonal work to tech talk
</commit_message>
<xml_diff>
--- a/service-workers-tech-talk.pptx
+++ b/service-workers-tech-talk.pptx
@@ -5,7 +5,7 @@
     <p:sldMasterId id="2147483649" r:id="rId1"/>
   </p:sldMasterIdLst>
   <p:notesMasterIdLst>
-    <p:notesMasterId r:id="rId11"/>
+    <p:notesMasterId r:id="rId13"/>
   </p:notesMasterIdLst>
   <p:sldIdLst>
     <p:sldId id="257" r:id="rId2"/>
@@ -14,9 +14,11 @@
     <p:sldId id="261" r:id="rId5"/>
     <p:sldId id="264" r:id="rId6"/>
     <p:sldId id="262" r:id="rId7"/>
-    <p:sldId id="263" r:id="rId8"/>
-    <p:sldId id="265" r:id="rId9"/>
-    <p:sldId id="259" r:id="rId10"/>
+    <p:sldId id="267" r:id="rId8"/>
+    <p:sldId id="263" r:id="rId9"/>
+    <p:sldId id="265" r:id="rId10"/>
+    <p:sldId id="266" r:id="rId11"/>
+    <p:sldId id="259" r:id="rId12"/>
   </p:sldIdLst>
   <p:sldSz cx="9144000" cy="5143500" type="screen16x9"/>
   <p:notesSz cx="6858000" cy="9144000"/>
@@ -10674,6 +10676,272 @@
 </p:sld>
 </file>
 
+<file path=ppt/slides/slide10.xml><?xml version="1.0" encoding="utf-8"?>
+<p:sld xmlns:a="http://schemas.openxmlformats.org/drawingml/2006/main" xmlns:r="http://schemas.openxmlformats.org/officeDocument/2006/relationships" xmlns:p="http://schemas.openxmlformats.org/presentationml/2006/main">
+  <p:cSld>
+    <p:spTree>
+      <p:nvGrpSpPr>
+        <p:cNvPr id="1" name=""/>
+        <p:cNvGrpSpPr/>
+        <p:nvPr/>
+      </p:nvGrpSpPr>
+      <p:grpSpPr>
+        <a:xfrm>
+          <a:off x="0" y="0"/>
+          <a:ext cx="0" cy="0"/>
+          <a:chOff x="0" y="0"/>
+          <a:chExt cx="0" cy="0"/>
+        </a:xfrm>
+      </p:grpSpPr>
+      <p:sp>
+        <p:nvSpPr>
+          <p:cNvPr id="2" name="Text Placeholder 1"/>
+          <p:cNvSpPr>
+            <a:spLocks noGrp="1"/>
+          </p:cNvSpPr>
+          <p:nvPr>
+            <p:ph type="body" idx="1"/>
+          </p:nvPr>
+        </p:nvSpPr>
+        <p:spPr/>
+        <p:txBody>
+          <a:bodyPr/>
+          <a:lstStyle/>
+          <a:p>
+            <a:r>
+              <a:rPr lang="en-US" dirty="0"/>
+              <a:t>https://</a:t>
+            </a:r>
+            <a:r>
+              <a:rPr lang="en-US" dirty="0" err="1"/>
+              <a:t>github.com</a:t>
+            </a:r>
+            <a:r>
+              <a:rPr lang="en-US" dirty="0"/>
+              <a:t>/</a:t>
+            </a:r>
+            <a:r>
+              <a:rPr lang="en-US" dirty="0" err="1"/>
+              <a:t>GoogleChrome</a:t>
+            </a:r>
+            <a:r>
+              <a:rPr lang="en-US" dirty="0"/>
+              <a:t>/</a:t>
+            </a:r>
+            <a:r>
+              <a:rPr lang="en-US" dirty="0" err="1"/>
+              <a:t>sw-precache</a:t>
+            </a:r>
+            <a:endParaRPr lang="en-US" dirty="0"/>
+          </a:p>
+        </p:txBody>
+      </p:sp>
+      <p:sp>
+        <p:nvSpPr>
+          <p:cNvPr id="3" name="Slide Number Placeholder 2"/>
+          <p:cNvSpPr>
+            <a:spLocks noGrp="1"/>
+          </p:cNvSpPr>
+          <p:nvPr>
+            <p:ph type="sldNum" sz="quarter" idx="4"/>
+          </p:nvPr>
+        </p:nvSpPr>
+        <p:spPr/>
+        <p:txBody>
+          <a:bodyPr/>
+          <a:lstStyle/>
+          <a:p>
+            <a:fld id="{7F0C0638-1B9A-A247-8307-B3AEFFB0D215}" type="slidenum">
+              <a:rPr lang="en-US" smtClean="0"/>
+              <a:pPr/>
+              <a:t>10</a:t>
+            </a:fld>
+            <a:endParaRPr lang="en-US" dirty="0"/>
+          </a:p>
+        </p:txBody>
+      </p:sp>
+      <p:sp>
+        <p:nvSpPr>
+          <p:cNvPr id="4" name="Title 3"/>
+          <p:cNvSpPr>
+            <a:spLocks noGrp="1"/>
+          </p:cNvSpPr>
+          <p:nvPr>
+            <p:ph type="title"/>
+          </p:nvPr>
+        </p:nvSpPr>
+        <p:spPr/>
+        <p:txBody>
+          <a:bodyPr/>
+          <a:lstStyle/>
+          <a:p>
+            <a:r>
+              <a:rPr lang="en-US" dirty="0" smtClean="0"/>
+              <a:t>There’s modules for it!</a:t>
+            </a:r>
+            <a:endParaRPr lang="en-US" dirty="0"/>
+          </a:p>
+        </p:txBody>
+      </p:sp>
+    </p:spTree>
+    <p:extLst>
+      <p:ext uri="{BB962C8B-B14F-4D97-AF65-F5344CB8AC3E}">
+        <p14:creationId xmlns:p14="http://schemas.microsoft.com/office/powerpoint/2010/main" val="296034021"/>
+      </p:ext>
+    </p:extLst>
+  </p:cSld>
+  <p:clrMapOvr>
+    <a:masterClrMapping/>
+  </p:clrMapOvr>
+</p:sld>
+</file>
+
+<file path=ppt/slides/slide11.xml><?xml version="1.0" encoding="utf-8"?>
+<p:sld xmlns:a="http://schemas.openxmlformats.org/drawingml/2006/main" xmlns:r="http://schemas.openxmlformats.org/officeDocument/2006/relationships" xmlns:p="http://schemas.openxmlformats.org/presentationml/2006/main">
+  <p:cSld>
+    <p:spTree>
+      <p:nvGrpSpPr>
+        <p:cNvPr id="1" name=""/>
+        <p:cNvGrpSpPr/>
+        <p:nvPr/>
+      </p:nvGrpSpPr>
+      <p:grpSpPr>
+        <a:xfrm>
+          <a:off x="0" y="0"/>
+          <a:ext cx="0" cy="0"/>
+          <a:chOff x="0" y="0"/>
+          <a:chExt cx="0" cy="0"/>
+        </a:xfrm>
+      </p:grpSpPr>
+      <p:sp>
+        <p:nvSpPr>
+          <p:cNvPr id="2" name="Text Placeholder 1"/>
+          <p:cNvSpPr>
+            <a:spLocks noGrp="1"/>
+          </p:cNvSpPr>
+          <p:nvPr>
+            <p:ph type="body" idx="1"/>
+          </p:nvPr>
+        </p:nvSpPr>
+        <p:spPr/>
+        <p:txBody>
+          <a:bodyPr/>
+          <a:lstStyle/>
+          <a:p>
+            <a:r>
+              <a:rPr lang="en-US" dirty="0">
+                <a:hlinkClick r:id="rId2"/>
+              </a:rPr>
+              <a:t>https://</a:t>
+            </a:r>
+            <a:r>
+              <a:rPr lang="en-US" dirty="0" smtClean="0">
+                <a:hlinkClick r:id="rId2"/>
+              </a:rPr>
+              <a:t>developers.google.com/web/fundamentals/getting-started/primers/service-workers</a:t>
+            </a:r>
+            <a:endParaRPr lang="en-US" dirty="0" smtClean="0"/>
+          </a:p>
+          <a:p>
+            <a:r>
+              <a:rPr lang="en-US" dirty="0">
+                <a:hlinkClick r:id="rId3"/>
+              </a:rPr>
+              <a:t>https://googlechrome.github.io/samples/service-worker/fallback-response</a:t>
+            </a:r>
+            <a:r>
+              <a:rPr lang="en-US" dirty="0" smtClean="0">
+                <a:hlinkClick r:id="rId3"/>
+              </a:rPr>
+              <a:t>/</a:t>
+            </a:r>
+          </a:p>
+          <a:p>
+            <a:r>
+              <a:rPr lang="en-US" dirty="0" smtClean="0">
+                <a:hlinkClick r:id="rId3"/>
+              </a:rPr>
+              <a:t>http</a:t>
+            </a:r>
+            <a:r>
+              <a:rPr lang="en-US" dirty="0">
+                <a:hlinkClick r:id="rId3"/>
+              </a:rPr>
+              <a:t>://</a:t>
+            </a:r>
+            <a:r>
+              <a:rPr lang="en-US" dirty="0" smtClean="0">
+                <a:hlinkClick r:id="rId3"/>
+              </a:rPr>
+              <a:t>thecatapi.com/api/images/get?format=src&amp;size=small</a:t>
+            </a:r>
+            <a:endParaRPr lang="en-US" dirty="0" smtClean="0"/>
+          </a:p>
+          <a:p>
+            <a:endParaRPr lang="en-US" dirty="0"/>
+          </a:p>
+        </p:txBody>
+      </p:sp>
+      <p:sp>
+        <p:nvSpPr>
+          <p:cNvPr id="3" name="Slide Number Placeholder 2"/>
+          <p:cNvSpPr>
+            <a:spLocks noGrp="1"/>
+          </p:cNvSpPr>
+          <p:nvPr>
+            <p:ph type="sldNum" sz="quarter" idx="4"/>
+          </p:nvPr>
+        </p:nvSpPr>
+        <p:spPr/>
+        <p:txBody>
+          <a:bodyPr/>
+          <a:lstStyle/>
+          <a:p>
+            <a:fld id="{7F0C0638-1B9A-A247-8307-B3AEFFB0D215}" type="slidenum">
+              <a:rPr lang="en-US" smtClean="0"/>
+              <a:pPr/>
+              <a:t>11</a:t>
+            </a:fld>
+            <a:endParaRPr lang="en-US" dirty="0"/>
+          </a:p>
+        </p:txBody>
+      </p:sp>
+      <p:sp>
+        <p:nvSpPr>
+          <p:cNvPr id="4" name="Title 3"/>
+          <p:cNvSpPr>
+            <a:spLocks noGrp="1"/>
+          </p:cNvSpPr>
+          <p:nvPr>
+            <p:ph type="title"/>
+          </p:nvPr>
+        </p:nvSpPr>
+        <p:spPr/>
+        <p:txBody>
+          <a:bodyPr/>
+          <a:lstStyle/>
+          <a:p>
+            <a:r>
+              <a:rPr lang="en-US" dirty="0" smtClean="0"/>
+              <a:t>Links</a:t>
+            </a:r>
+            <a:endParaRPr lang="en-US" dirty="0"/>
+          </a:p>
+        </p:txBody>
+      </p:sp>
+    </p:spTree>
+    <p:extLst>
+      <p:ext uri="{BB962C8B-B14F-4D97-AF65-F5344CB8AC3E}">
+        <p14:creationId xmlns:p14="http://schemas.microsoft.com/office/powerpoint/2010/main" val="1331528581"/>
+      </p:ext>
+    </p:extLst>
+  </p:cSld>
+  <p:clrMapOvr>
+    <a:masterClrMapping/>
+  </p:clrMapOvr>
+</p:sld>
+</file>
+
 <file path=ppt/slides/slide2.xml><?xml version="1.0" encoding="utf-8"?>
 <p:sld xmlns:a="http://schemas.openxmlformats.org/drawingml/2006/main" xmlns:r="http://schemas.openxmlformats.org/officeDocument/2006/relationships" xmlns:p="http://schemas.openxmlformats.org/presentationml/2006/main">
   <p:cSld>
@@ -10730,7 +10998,11 @@
           <a:p>
             <a:r>
               <a:rPr lang="en-US" dirty="0" smtClean="0"/>
-              <a:t>This opens the door to new possibilities which don’t require user interaction/a browser.</a:t>
+              <a:t>This </a:t>
+            </a:r>
+            <a:r>
+              <a:rPr lang="en-US" dirty="0" smtClean="0"/>
+              <a:t>opens the door to new possibilities which don’t require user interaction/a browser.</a:t>
             </a:r>
           </a:p>
           <a:p>
@@ -11452,101 +11724,12 @@
             <p:ph type="body" idx="1"/>
           </p:nvPr>
         </p:nvSpPr>
-        <p:spPr>
-          <a:xfrm>
-            <a:off x="475154" y="1195388"/>
-            <a:ext cx="3415202" cy="3394075"/>
-          </a:xfrm>
-        </p:spPr>
-        <p:txBody>
-          <a:bodyPr>
-            <a:normAutofit/>
-          </a:bodyPr>
+        <p:spPr/>
+        <p:txBody>
+          <a:bodyPr/>
           <a:lstStyle/>
           <a:p>
-            <a:pPr marL="285750" indent="-285750">
-              <a:buFont typeface="Arial" charset="0"/>
-              <a:buChar char="•"/>
-            </a:pPr>
-            <a:r>
-              <a:rPr lang="en-US" dirty="0" smtClean="0"/>
-              <a:t>As you can see, Service Workers aren’t anywhere near ready. Even Chrome requires you to enable a flag.</a:t>
-            </a:r>
-          </a:p>
-          <a:p>
-            <a:pPr marL="285750" indent="-285750">
-              <a:buFont typeface="Arial" charset="0"/>
-              <a:buChar char="•"/>
-            </a:pPr>
-            <a:r>
-              <a:rPr lang="en-US" b="1" dirty="0" smtClean="0"/>
-              <a:t>Chrome &amp; Firefox: </a:t>
-            </a:r>
-            <a:r>
-              <a:rPr lang="en-US" dirty="0" smtClean="0"/>
-              <a:t>Ready with basic implementation</a:t>
-            </a:r>
-          </a:p>
-          <a:p>
-            <a:pPr marL="285750" indent="-285750">
-              <a:buFont typeface="Arial" charset="0"/>
-              <a:buChar char="•"/>
-            </a:pPr>
-            <a:r>
-              <a:rPr lang="en-US" b="1" dirty="0" smtClean="0"/>
-              <a:t>Safari: </a:t>
-            </a:r>
-            <a:r>
-              <a:rPr lang="en-US" dirty="0" smtClean="0"/>
-              <a:t>Under consideration (Brief positive signals in five year plan)</a:t>
-            </a:r>
-          </a:p>
-          <a:p>
-            <a:pPr marL="285750" indent="-285750">
-              <a:buFont typeface="Arial" charset="0"/>
-              <a:buChar char="•"/>
-            </a:pPr>
-            <a:r>
-              <a:rPr lang="en-US" b="1" dirty="0" smtClean="0"/>
-              <a:t>Edge: </a:t>
-            </a:r>
-            <a:r>
-              <a:rPr lang="en-US" dirty="0" smtClean="0"/>
-              <a:t>In Development </a:t>
-            </a:r>
-          </a:p>
-          <a:p>
-            <a:pPr marL="285750" indent="-285750">
-              <a:buFont typeface="Arial" charset="0"/>
-              <a:buChar char="•"/>
-            </a:pPr>
-            <a:endParaRPr lang="en-US" dirty="0"/>
-          </a:p>
-          <a:p>
-            <a:pPr marL="285750" indent="-285750">
-              <a:buFont typeface="Arial" charset="0"/>
-              <a:buChar char="•"/>
-            </a:pPr>
-            <a:endParaRPr lang="en-US" dirty="0" smtClean="0"/>
-          </a:p>
-          <a:p>
-            <a:pPr marL="285750" indent="-285750">
-              <a:buFont typeface="Arial" charset="0"/>
-              <a:buChar char="•"/>
-            </a:pPr>
-            <a:r>
-              <a:rPr lang="en-US" dirty="0">
-                <a:hlinkClick r:id="rId2"/>
-              </a:rPr>
-              <a:t>https://jakearchibald.github.io/isserviceworkerready</a:t>
-            </a:r>
-            <a:r>
-              <a:rPr lang="en-US" dirty="0" smtClean="0">
-                <a:hlinkClick r:id="rId2"/>
-              </a:rPr>
-              <a:t>/</a:t>
-            </a:r>
-            <a:endParaRPr lang="en-US" dirty="0" smtClean="0"/>
+            <a:endParaRPr lang="en-US"/>
           </a:p>
         </p:txBody>
       </p:sp>
@@ -11591,46 +11774,16 @@
           <a:p>
             <a:r>
               <a:rPr lang="en-US" dirty="0" smtClean="0"/>
-              <a:t>It’s not ready yet!</a:t>
-            </a:r>
-            <a:endParaRPr lang="en-US" dirty="0"/>
-          </a:p>
-        </p:txBody>
-      </p:sp>
-      <p:pic>
-        <p:nvPicPr>
-          <p:cNvPr id="5" name="Picture 4"/>
-          <p:cNvPicPr>
-            <a:picLocks noChangeAspect="1"/>
-          </p:cNvPicPr>
-          <p:nvPr/>
-        </p:nvPicPr>
-        <p:blipFill>
-          <a:blip r:embed="rId3">
-            <a:extLst>
-              <a:ext uri="{28A0092B-C50C-407E-A947-70E740481C1C}">
-                <a14:useLocalDpi xmlns:a14="http://schemas.microsoft.com/office/drawing/2010/main" val="0"/>
-              </a:ext>
-            </a:extLst>
-          </a:blip>
-          <a:stretch>
-            <a:fillRect/>
-          </a:stretch>
-        </p:blipFill>
-        <p:spPr>
-          <a:xfrm>
-            <a:off x="4351466" y="2110279"/>
-            <a:ext cx="4429860" cy="998680"/>
-          </a:xfrm>
-          <a:prstGeom prst="rect">
-            <a:avLst/>
-          </a:prstGeom>
-        </p:spPr>
-      </p:pic>
+              <a:t>PROGRESSIVE WEB APPS (PWA)</a:t>
+            </a:r>
+            <a:endParaRPr lang="en-US" dirty="0"/>
+          </a:p>
+        </p:txBody>
+      </p:sp>
     </p:spTree>
     <p:extLst>
       <p:ext uri="{BB962C8B-B14F-4D97-AF65-F5344CB8AC3E}">
-        <p14:creationId xmlns:p14="http://schemas.microsoft.com/office/powerpoint/2010/main" val="975367692"/>
+        <p14:creationId xmlns:p14="http://schemas.microsoft.com/office/powerpoint/2010/main" val="887069616"/>
       </p:ext>
     </p:extLst>
   </p:cSld>
@@ -11667,9 +11820,16 @@
             <p:ph type="body" idx="1"/>
           </p:nvPr>
         </p:nvSpPr>
-        <p:spPr/>
-        <p:txBody>
-          <a:bodyPr/>
+        <p:spPr>
+          <a:xfrm>
+            <a:off x="475154" y="1195388"/>
+            <a:ext cx="3415202" cy="3394075"/>
+          </a:xfrm>
+        </p:spPr>
+        <p:txBody>
+          <a:bodyPr>
+            <a:normAutofit/>
+          </a:bodyPr>
           <a:lstStyle/>
           <a:p>
             <a:pPr marL="285750" indent="-285750">
@@ -11677,8 +11837,8 @@
               <a:buChar char="•"/>
             </a:pPr>
             <a:r>
-              <a:rPr lang="en-US" b="1" dirty="0" smtClean="0"/>
-              <a:t>Supported Browser </a:t>
+              <a:rPr lang="en-US" dirty="0" smtClean="0"/>
+              <a:t>As you can see, Service Workers aren’t anywhere near ready. Even Chrome requires you to enable a flag.</a:t>
             </a:r>
           </a:p>
           <a:p>
@@ -11687,24 +11847,12 @@
               <a:buChar char="•"/>
             </a:pPr>
             <a:r>
+              <a:rPr lang="en-US" b="1" dirty="0" smtClean="0"/>
+              <a:t>Chrome &amp; Firefox: </a:t>
+            </a:r>
+            <a:r>
               <a:rPr lang="en-US" dirty="0" smtClean="0"/>
-              <a:t>Supported Browser with </a:t>
-            </a:r>
-            <a:r>
-              <a:rPr lang="en-US" b="1" dirty="0" smtClean="0"/>
-              <a:t>good debugging tools </a:t>
-            </a:r>
-            <a:r>
-              <a:rPr lang="en-US" dirty="0" smtClean="0"/>
-              <a:t>(mainly Chrome </a:t>
-            </a:r>
-            <a:r>
-              <a:rPr lang="en-US" dirty="0" err="1" smtClean="0"/>
-              <a:t>atm</a:t>
-            </a:r>
-            <a:r>
-              <a:rPr lang="en-US" dirty="0" smtClean="0"/>
-              <a:t>)</a:t>
+              <a:t>Ready with basic implementation</a:t>
             </a:r>
           </a:p>
           <a:p>
@@ -11714,7 +11862,11 @@
             </a:pPr>
             <a:r>
               <a:rPr lang="en-US" b="1" dirty="0" smtClean="0"/>
-              <a:t>HTTPS</a:t>
+              <a:t>Safari: </a:t>
+            </a:r>
+            <a:r>
+              <a:rPr lang="en-US" dirty="0" smtClean="0"/>
+              <a:t>Under consideration (Brief positive signals in five year plan)</a:t>
             </a:r>
           </a:p>
           <a:p>
@@ -11724,11 +11876,11 @@
             </a:pPr>
             <a:r>
               <a:rPr lang="en-US" b="1" dirty="0" smtClean="0"/>
-              <a:t>Basic understanding of ES6 </a:t>
+              <a:t>Edge: </a:t>
             </a:r>
             <a:r>
               <a:rPr lang="en-US" dirty="0" smtClean="0"/>
-              <a:t>(this isn’t required but a lot of the examples online are using it)</a:t>
+              <a:t>In Development </a:t>
             </a:r>
           </a:p>
           <a:p>
@@ -11736,21 +11888,33 @@
               <a:buFont typeface="Arial" charset="0"/>
               <a:buChar char="•"/>
             </a:pPr>
-            <a:r>
-              <a:rPr lang="en-US" dirty="0" smtClean="0"/>
-              <a:t>Understanding of </a:t>
-            </a:r>
-            <a:r>
-              <a:rPr lang="en-US" b="1" dirty="0" smtClean="0"/>
-              <a:t>how (ES6) Promises work</a:t>
-            </a:r>
+            <a:endParaRPr lang="en-US" dirty="0"/>
           </a:p>
           <a:p>
             <a:pPr marL="285750" indent="-285750">
               <a:buFont typeface="Arial" charset="0"/>
               <a:buChar char="•"/>
             </a:pPr>
-            <a:endParaRPr lang="en-US" dirty="0"/>
+            <a:endParaRPr lang="en-US" dirty="0" smtClean="0"/>
+          </a:p>
+          <a:p>
+            <a:pPr marL="285750" indent="-285750">
+              <a:buFont typeface="Arial" charset="0"/>
+              <a:buChar char="•"/>
+            </a:pPr>
+            <a:r>
+              <a:rPr lang="en-US" dirty="0">
+                <a:hlinkClick r:id="rId2"/>
+              </a:rPr>
+              <a:t>https://jakearchibald.github.io/isserviceworkerready</a:t>
+            </a:r>
+            <a:r>
+              <a:rPr lang="en-US" dirty="0" smtClean="0">
+                <a:hlinkClick r:id="rId2"/>
+              </a:rPr>
+              <a:t>/</a:t>
+            </a:r>
+            <a:endParaRPr lang="en-US" dirty="0" smtClean="0"/>
           </a:p>
         </p:txBody>
       </p:sp>
@@ -11795,16 +11959,46 @@
           <a:p>
             <a:r>
               <a:rPr lang="en-US" dirty="0" smtClean="0"/>
-              <a:t>Prerequisites	</a:t>
-            </a:r>
-            <a:endParaRPr lang="en-US" dirty="0"/>
-          </a:p>
-        </p:txBody>
-      </p:sp>
+              <a:t>It’s not ready yet!</a:t>
+            </a:r>
+            <a:endParaRPr lang="en-US" dirty="0"/>
+          </a:p>
+        </p:txBody>
+      </p:sp>
+      <p:pic>
+        <p:nvPicPr>
+          <p:cNvPr id="5" name="Picture 4"/>
+          <p:cNvPicPr>
+            <a:picLocks noChangeAspect="1"/>
+          </p:cNvPicPr>
+          <p:nvPr/>
+        </p:nvPicPr>
+        <p:blipFill>
+          <a:blip r:embed="rId3">
+            <a:extLst>
+              <a:ext uri="{28A0092B-C50C-407E-A947-70E740481C1C}">
+                <a14:useLocalDpi xmlns:a14="http://schemas.microsoft.com/office/drawing/2010/main" val="0"/>
+              </a:ext>
+            </a:extLst>
+          </a:blip>
+          <a:stretch>
+            <a:fillRect/>
+          </a:stretch>
+        </p:blipFill>
+        <p:spPr>
+          <a:xfrm>
+            <a:off x="4351466" y="2110279"/>
+            <a:ext cx="4429860" cy="998680"/>
+          </a:xfrm>
+          <a:prstGeom prst="rect">
+            <a:avLst/>
+          </a:prstGeom>
+        </p:spPr>
+      </p:pic>
     </p:spTree>
     <p:extLst>
       <p:ext uri="{BB962C8B-B14F-4D97-AF65-F5344CB8AC3E}">
-        <p14:creationId xmlns:p14="http://schemas.microsoft.com/office/powerpoint/2010/main" val="219284305"/>
+        <p14:creationId xmlns:p14="http://schemas.microsoft.com/office/powerpoint/2010/main" val="975367692"/>
       </p:ext>
     </p:extLst>
   </p:cSld>
@@ -11846,56 +12040,84 @@
           <a:bodyPr/>
           <a:lstStyle/>
           <a:p>
-            <a:r>
-              <a:rPr lang="en-US" dirty="0">
-                <a:hlinkClick r:id="rId2"/>
-              </a:rPr>
-              <a:t>https://</a:t>
-            </a:r>
-            <a:r>
-              <a:rPr lang="en-US" dirty="0" smtClean="0">
-                <a:hlinkClick r:id="rId2"/>
-              </a:rPr>
-              <a:t>developers.google.com/web/fundamentals/getting-started/primers/service-workers</a:t>
-            </a:r>
-            <a:endParaRPr lang="en-US" dirty="0" smtClean="0"/>
-          </a:p>
-          <a:p>
-            <a:r>
-              <a:rPr lang="en-US" dirty="0">
-                <a:hlinkClick r:id="rId3"/>
-              </a:rPr>
-              <a:t>https://googlechrome.github.io/samples/service-worker/fallback-response</a:t>
-            </a:r>
-            <a:r>
-              <a:rPr lang="en-US" dirty="0" smtClean="0">
-                <a:hlinkClick r:id="rId3"/>
-              </a:rPr>
-              <a:t>/</a:t>
-            </a:r>
-          </a:p>
-          <a:p>
-            <a:r>
-              <a:rPr lang="en-US" dirty="0" smtClean="0">
-                <a:hlinkClick r:id="rId3"/>
-              </a:rPr>
-              <a:t>http</a:t>
-            </a:r>
-            <a:r>
-              <a:rPr lang="en-US" dirty="0">
-                <a:hlinkClick r:id="rId3"/>
-              </a:rPr>
-              <a:t>://</a:t>
-            </a:r>
-            <a:r>
-              <a:rPr lang="en-US" dirty="0" smtClean="0">
-                <a:hlinkClick r:id="rId3"/>
-              </a:rPr>
-              <a:t>thecatapi.com/api/images/get?format=src&amp;size=small</a:t>
-            </a:r>
-            <a:endParaRPr lang="en-US" dirty="0" smtClean="0"/>
-          </a:p>
-          <a:p>
+            <a:pPr marL="285750" indent="-285750">
+              <a:buFont typeface="Arial" charset="0"/>
+              <a:buChar char="•"/>
+            </a:pPr>
+            <a:r>
+              <a:rPr lang="en-US" b="1" dirty="0" smtClean="0"/>
+              <a:t>Supported Browser </a:t>
+            </a:r>
+          </a:p>
+          <a:p>
+            <a:pPr marL="285750" indent="-285750">
+              <a:buFont typeface="Arial" charset="0"/>
+              <a:buChar char="•"/>
+            </a:pPr>
+            <a:r>
+              <a:rPr lang="en-US" dirty="0" smtClean="0"/>
+              <a:t>Supported Browser with </a:t>
+            </a:r>
+            <a:r>
+              <a:rPr lang="en-US" b="1" dirty="0" smtClean="0"/>
+              <a:t>good debugging tools </a:t>
+            </a:r>
+            <a:r>
+              <a:rPr lang="en-US" dirty="0" smtClean="0"/>
+              <a:t>(mainly Chrome </a:t>
+            </a:r>
+            <a:r>
+              <a:rPr lang="en-US" dirty="0" err="1" smtClean="0"/>
+              <a:t>atm</a:t>
+            </a:r>
+            <a:r>
+              <a:rPr lang="en-US" dirty="0" smtClean="0"/>
+              <a:t>)</a:t>
+            </a:r>
+          </a:p>
+          <a:p>
+            <a:pPr marL="285750" indent="-285750">
+              <a:buFont typeface="Arial" charset="0"/>
+              <a:buChar char="•"/>
+            </a:pPr>
+            <a:r>
+              <a:rPr lang="en-US" b="1" dirty="0" smtClean="0"/>
+              <a:t>HTTPS</a:t>
+            </a:r>
+          </a:p>
+          <a:p>
+            <a:pPr marL="285750" indent="-285750">
+              <a:buFont typeface="Arial" charset="0"/>
+              <a:buChar char="•"/>
+            </a:pPr>
+            <a:r>
+              <a:rPr lang="en-US" b="1" dirty="0" smtClean="0"/>
+              <a:t>Basic understanding of ES6 </a:t>
+            </a:r>
+            <a:r>
+              <a:rPr lang="en-US" dirty="0" smtClean="0"/>
+              <a:t>(this isn’t required but a lot of the examples online are using it)</a:t>
+            </a:r>
+          </a:p>
+          <a:p>
+            <a:pPr marL="285750" indent="-285750">
+              <a:buFont typeface="Arial" charset="0"/>
+              <a:buChar char="•"/>
+            </a:pPr>
+            <a:r>
+              <a:rPr lang="en-US" dirty="0" smtClean="0"/>
+              <a:t>Understanding of </a:t>
+            </a:r>
+            <a:r>
+              <a:rPr lang="en-US" b="1" dirty="0" smtClean="0"/>
+              <a:t>how (ES6) Promises work</a:t>
+            </a:r>
+          </a:p>
+          <a:p>
+            <a:pPr marL="285750" indent="-285750">
+              <a:buFont typeface="Arial" charset="0"/>
+              <a:buChar char="•"/>
+            </a:pPr>
             <a:endParaRPr lang="en-US" dirty="0"/>
           </a:p>
         </p:txBody>
@@ -11941,7 +12163,7 @@
           <a:p>
             <a:r>
               <a:rPr lang="en-US" dirty="0" smtClean="0"/>
-              <a:t>Links</a:t>
+              <a:t>Prerequisites	</a:t>
             </a:r>
             <a:endParaRPr lang="en-US" dirty="0"/>
           </a:p>
@@ -11950,7 +12172,7 @@
     </p:spTree>
     <p:extLst>
       <p:ext uri="{BB962C8B-B14F-4D97-AF65-F5344CB8AC3E}">
-        <p14:creationId xmlns:p14="http://schemas.microsoft.com/office/powerpoint/2010/main" val="1331528581"/>
+        <p14:creationId xmlns:p14="http://schemas.microsoft.com/office/powerpoint/2010/main" val="219284305"/>
       </p:ext>
     </p:extLst>
   </p:cSld>

</xml_diff>